<commit_message>
update session 1 - add slide transactions
</commit_message>
<xml_diff>
--- a/slides/Session 01 - Introduction to Data Science.pptx
+++ b/slides/Session 01 - Introduction to Data Science.pptx
@@ -927,7 +927,7 @@
             </a:spcAft>
           </a:pPr>
           <a:r>
-            <a:rPr lang="en-US"/>
+            <a:rPr lang="en-US" dirty="0"/>
             <a:t>Gather</a:t>
           </a:r>
         </a:p>
@@ -936,10 +936,24 @@
     <dgm:pt modelId="{3D1AB2CA-88A4-4E4C-9A8A-508DF0E06639}" type="parTrans" cxnId="{8AA3A503-A788-433D-A7C2-119D2F38702E}">
       <dgm:prSet/>
       <dgm:spPr/>
+      <dgm:t>
+        <a:bodyPr/>
+        <a:lstStyle/>
+        <a:p>
+          <a:endParaRPr lang="en-US"/>
+        </a:p>
+      </dgm:t>
     </dgm:pt>
     <dgm:pt modelId="{856E2728-BF00-49C7-82BA-8F4DCB00940B}" type="sibTrans" cxnId="{8AA3A503-A788-433D-A7C2-119D2F38702E}">
       <dgm:prSet/>
       <dgm:spPr/>
+      <dgm:t>
+        <a:bodyPr/>
+        <a:lstStyle/>
+        <a:p>
+          <a:endParaRPr lang="en-US"/>
+        </a:p>
+      </dgm:t>
     </dgm:pt>
     <dgm:pt modelId="{1AA64000-5F0F-47A8-A435-2AF8D82F28B1}">
       <dgm:prSet phldrT="[Text]" phldr="0" custT="0"/>
@@ -969,10 +983,24 @@
     <dgm:pt modelId="{845A32C3-0E8A-4EED-972E-FC6F9A8364F8}" type="parTrans" cxnId="{D7340DBC-9EB3-4A90-A3A3-4ADBAA5877D3}">
       <dgm:prSet/>
       <dgm:spPr/>
+      <dgm:t>
+        <a:bodyPr/>
+        <a:lstStyle/>
+        <a:p>
+          <a:endParaRPr lang="en-US"/>
+        </a:p>
+      </dgm:t>
     </dgm:pt>
     <dgm:pt modelId="{C0D86BAE-7711-4781-A574-7BE0EA273229}" type="sibTrans" cxnId="{D7340DBC-9EB3-4A90-A3A3-4ADBAA5877D3}">
       <dgm:prSet/>
       <dgm:spPr/>
+      <dgm:t>
+        <a:bodyPr/>
+        <a:lstStyle/>
+        <a:p>
+          <a:endParaRPr lang="en-US"/>
+        </a:p>
+      </dgm:t>
     </dgm:pt>
     <dgm:pt modelId="{9C12F5BE-AC2F-4662-8DFA-C79428950CF2}">
       <dgm:prSet phldrT="[Text]" phldr="0" custT="0"/>
@@ -1002,10 +1030,24 @@
     <dgm:pt modelId="{E2B7565C-BEBF-47B7-AC71-10023CB96091}" type="parTrans" cxnId="{1BE8C5FF-102D-4C14-9E4B-4A047AC87322}">
       <dgm:prSet/>
       <dgm:spPr/>
+      <dgm:t>
+        <a:bodyPr/>
+        <a:lstStyle/>
+        <a:p>
+          <a:endParaRPr lang="en-US"/>
+        </a:p>
+      </dgm:t>
     </dgm:pt>
     <dgm:pt modelId="{BE48B07B-4C6F-4C50-9D7F-CE1D6590BF95}" type="sibTrans" cxnId="{1BE8C5FF-102D-4C14-9E4B-4A047AC87322}">
       <dgm:prSet/>
       <dgm:spPr/>
+      <dgm:t>
+        <a:bodyPr/>
+        <a:lstStyle/>
+        <a:p>
+          <a:endParaRPr lang="en-US"/>
+        </a:p>
+      </dgm:t>
     </dgm:pt>
     <dgm:pt modelId="{69A34FA6-AE94-441C-9DF5-A029DE71C5C1}">
       <dgm:prSet phldr="0" custT="0"/>
@@ -1035,10 +1077,24 @@
     <dgm:pt modelId="{7CE17E2D-B914-43DE-92D0-4E00843C0D2D}" type="parTrans" cxnId="{303DA51C-277C-4181-A73F-B4C74AF60271}">
       <dgm:prSet/>
       <dgm:spPr/>
+      <dgm:t>
+        <a:bodyPr/>
+        <a:lstStyle/>
+        <a:p>
+          <a:endParaRPr lang="en-US"/>
+        </a:p>
+      </dgm:t>
     </dgm:pt>
     <dgm:pt modelId="{76530BCF-0642-47C8-BC97-41B5662E466A}" type="sibTrans" cxnId="{303DA51C-277C-4181-A73F-B4C74AF60271}">
       <dgm:prSet/>
       <dgm:spPr/>
+      <dgm:t>
+        <a:bodyPr/>
+        <a:lstStyle/>
+        <a:p>
+          <a:endParaRPr lang="en-US"/>
+        </a:p>
+      </dgm:t>
     </dgm:pt>
     <dgm:pt modelId="{8898168D-FC22-400F-A732-7FC81B805255}">
       <dgm:prSet phldr="0" custT="0"/>
@@ -1068,10 +1124,24 @@
     <dgm:pt modelId="{735708B0-4498-4EA6-A3AD-991FDCD1BC95}" type="parTrans" cxnId="{955E6F13-2A88-452D-AA2D-4C12C87BA9E1}">
       <dgm:prSet/>
       <dgm:spPr/>
+      <dgm:t>
+        <a:bodyPr/>
+        <a:lstStyle/>
+        <a:p>
+          <a:endParaRPr lang="en-US"/>
+        </a:p>
+      </dgm:t>
     </dgm:pt>
     <dgm:pt modelId="{B9DDD71C-486C-40F3-AB72-A85754C595F1}" type="sibTrans" cxnId="{955E6F13-2A88-452D-AA2D-4C12C87BA9E1}">
       <dgm:prSet/>
       <dgm:spPr/>
+      <dgm:t>
+        <a:bodyPr/>
+        <a:lstStyle/>
+        <a:p>
+          <a:endParaRPr lang="en-US"/>
+        </a:p>
+      </dgm:t>
     </dgm:pt>
     <dgm:pt modelId="{60E81CF5-4537-4C2F-8762-598D2E914097}" type="pres">
       <dgm:prSet presAssocID="{9D527559-FDD8-4274-B634-C7FBCF5BC573}" presName="Name0" presStyleCnt="0">
@@ -1258,7 +1328,7 @@
             <a:buNone/>
           </a:pPr>
           <a:r>
-            <a:rPr lang="en-US" sz="1900" kern="1200"/>
+            <a:rPr lang="en-US" sz="1900" kern="1200" dirty="0"/>
             <a:t>Gather</a:t>
           </a:r>
         </a:p>
@@ -7319,18 +7389,6 @@
   <p:clrMapOvr>
     <a:masterClrMapping/>
   </p:clrMapOvr>
-  <mc:AlternateContent xmlns:mc="http://schemas.openxmlformats.org/markup-compatibility/2006" xmlns:p14="http://schemas.microsoft.com/office/powerpoint/2010/main">
-    <mc:Choice Requires="p14">
-      <p:transition spd="slow" p14:dur="1200">
-        <p:dissolve/>
-      </p:transition>
-    </mc:Choice>
-    <mc:Fallback xmlns="">
-      <p:transition spd="slow">
-        <p:dissolve/>
-      </p:transition>
-    </mc:Fallback>
-  </mc:AlternateContent>
 </p:sld>
 </file>
 
@@ -7394,7 +7452,7 @@
           <a:p>
             <a:pPr algn="l"/>
             <a:r>
-              <a:rPr lang="en-US" sz="2400">
+              <a:rPr lang="en-US" sz="2400" dirty="0">
                 <a:latin typeface="Ubuntu" panose="020B0504030602030204" charset="0"/>
                 <a:cs typeface="Ubuntu" panose="020B0504030602030204" charset="0"/>
               </a:rPr>
@@ -7404,7 +7462,7 @@
           <a:p>
             <a:pPr algn="l"/>
             <a:r>
-              <a:rPr lang="en-US" sz="2400">
+              <a:rPr lang="en-US" sz="2400" dirty="0">
                 <a:latin typeface="Ubuntu" panose="020B0504030602030204" charset="0"/>
                 <a:cs typeface="Ubuntu" panose="020B0504030602030204" charset="0"/>
               </a:rPr>
@@ -7414,7 +7472,7 @@
           <a:p>
             <a:pPr algn="l"/>
             <a:r>
-              <a:rPr lang="en-US" sz="2400">
+              <a:rPr lang="en-US" sz="2400" dirty="0">
                 <a:latin typeface="Ubuntu" panose="020B0504030602030204" charset="0"/>
                 <a:cs typeface="Ubuntu" panose="020B0504030602030204" charset="0"/>
               </a:rPr>
@@ -7428,6 +7486,198 @@
   <p:clrMapOvr>
     <a:masterClrMapping/>
   </p:clrMapOvr>
+  <mc:AlternateContent xmlns:mc="http://schemas.openxmlformats.org/markup-compatibility/2006">
+    <mc:Choice xmlns:p159="http://schemas.microsoft.com/office/powerpoint/2015/09/main" Requires="p159">
+      <p:transition xmlns:p14="http://schemas.microsoft.com/office/powerpoint/2010/main" spd="slow" p14:dur="2000">
+        <p159:morph option="byObject"/>
+      </p:transition>
+    </mc:Choice>
+    <mc:Fallback>
+      <p:transition spd="slow">
+        <p:fade/>
+      </p:transition>
+    </mc:Fallback>
+  </mc:AlternateContent>
+  <p:timing>
+    <p:tnLst>
+      <p:par>
+        <p:cTn id="1" dur="indefinite" restart="never" nodeType="tmRoot">
+          <p:childTnLst>
+            <p:seq concurrent="1" nextAc="seek">
+              <p:cTn id="2" dur="indefinite" nodeType="mainSeq">
+                <p:childTnLst>
+                  <p:par>
+                    <p:cTn id="3" fill="hold">
+                      <p:stCondLst>
+                        <p:cond delay="indefinite"/>
+                      </p:stCondLst>
+                      <p:childTnLst>
+                        <p:par>
+                          <p:cTn id="4" fill="hold">
+                            <p:stCondLst>
+                              <p:cond delay="0"/>
+                            </p:stCondLst>
+                            <p:childTnLst>
+                              <p:par>
+                                <p:cTn id="5" presetID="1" presetClass="entr" presetSubtype="0" fill="hold" grpId="0" nodeType="clickEffect">
+                                  <p:stCondLst>
+                                    <p:cond delay="0"/>
+                                  </p:stCondLst>
+                                  <p:childTnLst>
+                                    <p:set>
+                                      <p:cBhvr>
+                                        <p:cTn id="6" dur="1" fill="hold">
+                                          <p:stCondLst>
+                                            <p:cond delay="0"/>
+                                          </p:stCondLst>
+                                        </p:cTn>
+                                        <p:tgtEl>
+                                          <p:spTgt spid="3">
+                                            <p:txEl>
+                                              <p:pRg st="0" end="0"/>
+                                            </p:txEl>
+                                          </p:spTgt>
+                                        </p:tgtEl>
+                                        <p:attrNameLst>
+                                          <p:attrName>style.visibility</p:attrName>
+                                        </p:attrNameLst>
+                                      </p:cBhvr>
+                                      <p:to>
+                                        <p:strVal val="visible"/>
+                                      </p:to>
+                                    </p:set>
+                                  </p:childTnLst>
+                                </p:cTn>
+                              </p:par>
+                            </p:childTnLst>
+                          </p:cTn>
+                        </p:par>
+                      </p:childTnLst>
+                    </p:cTn>
+                  </p:par>
+                  <p:par>
+                    <p:cTn id="7" fill="hold">
+                      <p:stCondLst>
+                        <p:cond delay="indefinite"/>
+                      </p:stCondLst>
+                      <p:childTnLst>
+                        <p:par>
+                          <p:cTn id="8" fill="hold">
+                            <p:stCondLst>
+                              <p:cond delay="0"/>
+                            </p:stCondLst>
+                            <p:childTnLst>
+                              <p:par>
+                                <p:cTn id="9" presetID="1" presetClass="entr" presetSubtype="0" fill="hold" grpId="0" nodeType="clickEffect">
+                                  <p:stCondLst>
+                                    <p:cond delay="0"/>
+                                  </p:stCondLst>
+                                  <p:childTnLst>
+                                    <p:set>
+                                      <p:cBhvr>
+                                        <p:cTn id="10" dur="1" fill="hold">
+                                          <p:stCondLst>
+                                            <p:cond delay="0"/>
+                                          </p:stCondLst>
+                                        </p:cTn>
+                                        <p:tgtEl>
+                                          <p:spTgt spid="3">
+                                            <p:txEl>
+                                              <p:pRg st="1" end="1"/>
+                                            </p:txEl>
+                                          </p:spTgt>
+                                        </p:tgtEl>
+                                        <p:attrNameLst>
+                                          <p:attrName>style.visibility</p:attrName>
+                                        </p:attrNameLst>
+                                      </p:cBhvr>
+                                      <p:to>
+                                        <p:strVal val="visible"/>
+                                      </p:to>
+                                    </p:set>
+                                  </p:childTnLst>
+                                </p:cTn>
+                              </p:par>
+                            </p:childTnLst>
+                          </p:cTn>
+                        </p:par>
+                      </p:childTnLst>
+                    </p:cTn>
+                  </p:par>
+                  <p:par>
+                    <p:cTn id="11" fill="hold">
+                      <p:stCondLst>
+                        <p:cond delay="indefinite"/>
+                      </p:stCondLst>
+                      <p:childTnLst>
+                        <p:par>
+                          <p:cTn id="12" fill="hold">
+                            <p:stCondLst>
+                              <p:cond delay="0"/>
+                            </p:stCondLst>
+                            <p:childTnLst>
+                              <p:par>
+                                <p:cTn id="13" presetID="1" presetClass="entr" presetSubtype="0" fill="hold" grpId="0" nodeType="clickEffect">
+                                  <p:stCondLst>
+                                    <p:cond delay="0"/>
+                                  </p:stCondLst>
+                                  <p:childTnLst>
+                                    <p:set>
+                                      <p:cBhvr>
+                                        <p:cTn id="14" dur="1" fill="hold">
+                                          <p:stCondLst>
+                                            <p:cond delay="0"/>
+                                          </p:stCondLst>
+                                        </p:cTn>
+                                        <p:tgtEl>
+                                          <p:spTgt spid="3">
+                                            <p:txEl>
+                                              <p:pRg st="2" end="2"/>
+                                            </p:txEl>
+                                          </p:spTgt>
+                                        </p:tgtEl>
+                                        <p:attrNameLst>
+                                          <p:attrName>style.visibility</p:attrName>
+                                        </p:attrNameLst>
+                                      </p:cBhvr>
+                                      <p:to>
+                                        <p:strVal val="visible"/>
+                                      </p:to>
+                                    </p:set>
+                                  </p:childTnLst>
+                                </p:cTn>
+                              </p:par>
+                            </p:childTnLst>
+                          </p:cTn>
+                        </p:par>
+                      </p:childTnLst>
+                    </p:cTn>
+                  </p:par>
+                </p:childTnLst>
+              </p:cTn>
+              <p:prevCondLst>
+                <p:cond evt="onPrev" delay="0">
+                  <p:tgtEl>
+                    <p:sldTgt/>
+                  </p:tgtEl>
+                </p:cond>
+              </p:prevCondLst>
+              <p:nextCondLst>
+                <p:cond evt="onNext" delay="0">
+                  <p:tgtEl>
+                    <p:sldTgt/>
+                  </p:tgtEl>
+                </p:cond>
+              </p:nextCondLst>
+            </p:seq>
+          </p:childTnLst>
+        </p:cTn>
+      </p:par>
+    </p:tnLst>
+    <p:bldLst>
+      <p:bldP spid="3" grpId="0" build="p"/>
+    </p:bldLst>
+  </p:timing>
 </p:sld>
 </file>
 
@@ -7983,6 +8233,18 @@
   <p:clrMapOvr>
     <a:masterClrMapping/>
   </p:clrMapOvr>
+  <mc:AlternateContent xmlns:mc="http://schemas.openxmlformats.org/markup-compatibility/2006">
+    <mc:Choice xmlns:p159="http://schemas.microsoft.com/office/powerpoint/2015/09/main" Requires="p159">
+      <p:transition xmlns:p14="http://schemas.microsoft.com/office/powerpoint/2010/main" spd="slow" p14:dur="2000">
+        <p159:morph option="byObject"/>
+      </p:transition>
+    </mc:Choice>
+    <mc:Fallback>
+      <p:transition spd="slow">
+        <p:fade/>
+      </p:transition>
+    </mc:Fallback>
+  </mc:AlternateContent>
 </p:sld>
 </file>
 
@@ -8261,7 +8523,7 @@
           <a:p>
             <a:pPr algn="l"/>
             <a:r>
-              <a:rPr lang="en-US" sz="2400">
+              <a:rPr lang="en-US" sz="2400" dirty="0">
                 <a:latin typeface="Ubuntu" panose="020B0504030602030204" charset="0"/>
                 <a:cs typeface="Ubuntu" panose="020B0504030602030204" charset="0"/>
               </a:rPr>
@@ -8271,7 +8533,7 @@
           <a:p>
             <a:pPr algn="l"/>
             <a:r>
-              <a:rPr lang="en-US" sz="2400">
+              <a:rPr lang="en-US" sz="2400" dirty="0">
                 <a:latin typeface="Ubuntu" panose="020B0504030602030204" charset="0"/>
                 <a:cs typeface="Ubuntu" panose="020B0504030602030204" charset="0"/>
               </a:rPr>
@@ -8281,7 +8543,7 @@
           <a:p>
             <a:pPr algn="l"/>
             <a:r>
-              <a:rPr lang="en-US" sz="2400">
+              <a:rPr lang="en-US" sz="2400" dirty="0">
                 <a:latin typeface="Ubuntu" panose="020B0504030602030204" charset="0"/>
                 <a:cs typeface="Ubuntu" panose="020B0504030602030204" charset="0"/>
               </a:rPr>
@@ -8291,7 +8553,7 @@
           <a:p>
             <a:pPr algn="l"/>
             <a:r>
-              <a:rPr lang="en-US" sz="2400">
+              <a:rPr lang="en-US" sz="2400" dirty="0">
                 <a:latin typeface="Ubuntu" panose="020B0504030602030204" charset="0"/>
                 <a:cs typeface="Ubuntu" panose="020B0504030602030204" charset="0"/>
               </a:rPr>
@@ -8301,7 +8563,7 @@
           <a:p>
             <a:pPr algn="l"/>
             <a:r>
-              <a:rPr lang="en-US" sz="2400">
+              <a:rPr lang="en-US" sz="2400" dirty="0">
                 <a:latin typeface="Ubuntu" panose="020B0504030602030204" charset="0"/>
                 <a:cs typeface="Ubuntu" panose="020B0504030602030204" charset="0"/>
               </a:rPr>
@@ -8311,7 +8573,7 @@
           <a:p>
             <a:pPr algn="l"/>
             <a:r>
-              <a:rPr lang="en-US" sz="2400">
+              <a:rPr lang="en-US" sz="2400" dirty="0">
                 <a:latin typeface="Ubuntu" panose="020B0504030602030204" charset="0"/>
                 <a:cs typeface="Ubuntu" panose="020B0504030602030204" charset="0"/>
               </a:rPr>
@@ -8325,6 +8587,345 @@
   <p:clrMapOvr>
     <a:masterClrMapping/>
   </p:clrMapOvr>
+  <mc:AlternateContent xmlns:mc="http://schemas.openxmlformats.org/markup-compatibility/2006">
+    <mc:Choice xmlns:p159="http://schemas.microsoft.com/office/powerpoint/2015/09/main" Requires="p159">
+      <p:transition xmlns:p14="http://schemas.microsoft.com/office/powerpoint/2010/main" spd="slow" p14:dur="2000">
+        <p159:morph option="byObject"/>
+      </p:transition>
+    </mc:Choice>
+    <mc:Fallback>
+      <p:transition spd="slow">
+        <p:fade/>
+      </p:transition>
+    </mc:Fallback>
+  </mc:AlternateContent>
+  <p:timing>
+    <p:tnLst>
+      <p:par>
+        <p:cTn id="1" dur="indefinite" restart="never" nodeType="tmRoot">
+          <p:childTnLst>
+            <p:seq concurrent="1" nextAc="seek">
+              <p:cTn id="2" dur="indefinite" nodeType="mainSeq">
+                <p:childTnLst>
+                  <p:par>
+                    <p:cTn id="3" fill="hold">
+                      <p:stCondLst>
+                        <p:cond delay="indefinite"/>
+                      </p:stCondLst>
+                      <p:childTnLst>
+                        <p:par>
+                          <p:cTn id="4" fill="hold">
+                            <p:stCondLst>
+                              <p:cond delay="0"/>
+                            </p:stCondLst>
+                            <p:childTnLst>
+                              <p:par>
+                                <p:cTn id="5" presetID="1" presetClass="entr" presetSubtype="0" fill="hold" grpId="0" nodeType="clickEffect">
+                                  <p:stCondLst>
+                                    <p:cond delay="0"/>
+                                  </p:stCondLst>
+                                  <p:childTnLst>
+                                    <p:set>
+                                      <p:cBhvr>
+                                        <p:cTn id="6" dur="1" fill="hold">
+                                          <p:stCondLst>
+                                            <p:cond delay="0"/>
+                                          </p:stCondLst>
+                                        </p:cTn>
+                                        <p:tgtEl>
+                                          <p:spTgt spid="3">
+                                            <p:txEl>
+                                              <p:pRg st="0" end="0"/>
+                                            </p:txEl>
+                                          </p:spTgt>
+                                        </p:tgtEl>
+                                        <p:attrNameLst>
+                                          <p:attrName>style.visibility</p:attrName>
+                                        </p:attrNameLst>
+                                      </p:cBhvr>
+                                      <p:to>
+                                        <p:strVal val="visible"/>
+                                      </p:to>
+                                    </p:set>
+                                  </p:childTnLst>
+                                </p:cTn>
+                              </p:par>
+                            </p:childTnLst>
+                          </p:cTn>
+                        </p:par>
+                      </p:childTnLst>
+                    </p:cTn>
+                  </p:par>
+                  <p:par>
+                    <p:cTn id="7" fill="hold">
+                      <p:stCondLst>
+                        <p:cond delay="indefinite"/>
+                      </p:stCondLst>
+                      <p:childTnLst>
+                        <p:par>
+                          <p:cTn id="8" fill="hold">
+                            <p:stCondLst>
+                              <p:cond delay="0"/>
+                            </p:stCondLst>
+                            <p:childTnLst>
+                              <p:par>
+                                <p:cTn id="9" presetID="1" presetClass="entr" presetSubtype="0" fill="hold" grpId="0" nodeType="clickEffect">
+                                  <p:stCondLst>
+                                    <p:cond delay="0"/>
+                                  </p:stCondLst>
+                                  <p:childTnLst>
+                                    <p:set>
+                                      <p:cBhvr>
+                                        <p:cTn id="10" dur="1" fill="hold">
+                                          <p:stCondLst>
+                                            <p:cond delay="0"/>
+                                          </p:stCondLst>
+                                        </p:cTn>
+                                        <p:tgtEl>
+                                          <p:spTgt spid="3">
+                                            <p:txEl>
+                                              <p:pRg st="1" end="1"/>
+                                            </p:txEl>
+                                          </p:spTgt>
+                                        </p:tgtEl>
+                                        <p:attrNameLst>
+                                          <p:attrName>style.visibility</p:attrName>
+                                        </p:attrNameLst>
+                                      </p:cBhvr>
+                                      <p:to>
+                                        <p:strVal val="visible"/>
+                                      </p:to>
+                                    </p:set>
+                                  </p:childTnLst>
+                                </p:cTn>
+                              </p:par>
+                            </p:childTnLst>
+                          </p:cTn>
+                        </p:par>
+                      </p:childTnLst>
+                    </p:cTn>
+                  </p:par>
+                  <p:par>
+                    <p:cTn id="11" fill="hold">
+                      <p:stCondLst>
+                        <p:cond delay="indefinite"/>
+                      </p:stCondLst>
+                      <p:childTnLst>
+                        <p:par>
+                          <p:cTn id="12" fill="hold">
+                            <p:stCondLst>
+                              <p:cond delay="0"/>
+                            </p:stCondLst>
+                            <p:childTnLst>
+                              <p:par>
+                                <p:cTn id="13" presetID="1" presetClass="entr" presetSubtype="0" fill="hold" grpId="0" nodeType="clickEffect">
+                                  <p:stCondLst>
+                                    <p:cond delay="0"/>
+                                  </p:stCondLst>
+                                  <p:childTnLst>
+                                    <p:set>
+                                      <p:cBhvr>
+                                        <p:cTn id="14" dur="1" fill="hold">
+                                          <p:stCondLst>
+                                            <p:cond delay="0"/>
+                                          </p:stCondLst>
+                                        </p:cTn>
+                                        <p:tgtEl>
+                                          <p:spTgt spid="3">
+                                            <p:txEl>
+                                              <p:pRg st="2" end="2"/>
+                                            </p:txEl>
+                                          </p:spTgt>
+                                        </p:tgtEl>
+                                        <p:attrNameLst>
+                                          <p:attrName>style.visibility</p:attrName>
+                                        </p:attrNameLst>
+                                      </p:cBhvr>
+                                      <p:to>
+                                        <p:strVal val="visible"/>
+                                      </p:to>
+                                    </p:set>
+                                  </p:childTnLst>
+                                </p:cTn>
+                              </p:par>
+                            </p:childTnLst>
+                          </p:cTn>
+                        </p:par>
+                      </p:childTnLst>
+                    </p:cTn>
+                  </p:par>
+                  <p:par>
+                    <p:cTn id="15" fill="hold">
+                      <p:stCondLst>
+                        <p:cond delay="indefinite"/>
+                      </p:stCondLst>
+                      <p:childTnLst>
+                        <p:par>
+                          <p:cTn id="16" fill="hold">
+                            <p:stCondLst>
+                              <p:cond delay="0"/>
+                            </p:stCondLst>
+                            <p:childTnLst>
+                              <p:par>
+                                <p:cTn id="17" presetID="1" presetClass="entr" presetSubtype="0" fill="hold" grpId="0" nodeType="clickEffect">
+                                  <p:stCondLst>
+                                    <p:cond delay="0"/>
+                                  </p:stCondLst>
+                                  <p:childTnLst>
+                                    <p:set>
+                                      <p:cBhvr>
+                                        <p:cTn id="18" dur="1" fill="hold">
+                                          <p:stCondLst>
+                                            <p:cond delay="0"/>
+                                          </p:stCondLst>
+                                        </p:cTn>
+                                        <p:tgtEl>
+                                          <p:spTgt spid="3">
+                                            <p:txEl>
+                                              <p:pRg st="3" end="3"/>
+                                            </p:txEl>
+                                          </p:spTgt>
+                                        </p:tgtEl>
+                                        <p:attrNameLst>
+                                          <p:attrName>style.visibility</p:attrName>
+                                        </p:attrNameLst>
+                                      </p:cBhvr>
+                                      <p:to>
+                                        <p:strVal val="visible"/>
+                                      </p:to>
+                                    </p:set>
+                                  </p:childTnLst>
+                                </p:cTn>
+                              </p:par>
+                            </p:childTnLst>
+                          </p:cTn>
+                        </p:par>
+                      </p:childTnLst>
+                    </p:cTn>
+                  </p:par>
+                  <p:par>
+                    <p:cTn id="19" fill="hold">
+                      <p:stCondLst>
+                        <p:cond delay="indefinite"/>
+                      </p:stCondLst>
+                      <p:childTnLst>
+                        <p:par>
+                          <p:cTn id="20" fill="hold">
+                            <p:stCondLst>
+                              <p:cond delay="0"/>
+                            </p:stCondLst>
+                            <p:childTnLst>
+                              <p:par>
+                                <p:cTn id="21" presetID="1" presetClass="entr" presetSubtype="0" fill="hold" grpId="0" nodeType="clickEffect">
+                                  <p:stCondLst>
+                                    <p:cond delay="0"/>
+                                  </p:stCondLst>
+                                  <p:childTnLst>
+                                    <p:set>
+                                      <p:cBhvr>
+                                        <p:cTn id="22" dur="1" fill="hold">
+                                          <p:stCondLst>
+                                            <p:cond delay="0"/>
+                                          </p:stCondLst>
+                                        </p:cTn>
+                                        <p:tgtEl>
+                                          <p:spTgt spid="3">
+                                            <p:txEl>
+                                              <p:pRg st="4" end="4"/>
+                                            </p:txEl>
+                                          </p:spTgt>
+                                        </p:tgtEl>
+                                        <p:attrNameLst>
+                                          <p:attrName>style.visibility</p:attrName>
+                                        </p:attrNameLst>
+                                      </p:cBhvr>
+                                      <p:to>
+                                        <p:strVal val="visible"/>
+                                      </p:to>
+                                    </p:set>
+                                  </p:childTnLst>
+                                </p:cTn>
+                              </p:par>
+                            </p:childTnLst>
+                          </p:cTn>
+                        </p:par>
+                      </p:childTnLst>
+                    </p:cTn>
+                  </p:par>
+                  <p:par>
+                    <p:cTn id="23" fill="hold">
+                      <p:stCondLst>
+                        <p:cond delay="indefinite"/>
+                      </p:stCondLst>
+                      <p:childTnLst>
+                        <p:par>
+                          <p:cTn id="24" fill="hold">
+                            <p:stCondLst>
+                              <p:cond delay="0"/>
+                            </p:stCondLst>
+                            <p:childTnLst>
+                              <p:par>
+                                <p:cTn id="25" presetID="1" presetClass="entr" presetSubtype="0" fill="hold" grpId="0" nodeType="clickEffect">
+                                  <p:stCondLst>
+                                    <p:cond delay="0"/>
+                                  </p:stCondLst>
+                                  <p:childTnLst>
+                                    <p:set>
+                                      <p:cBhvr>
+                                        <p:cTn id="26" dur="1" fill="hold">
+                                          <p:stCondLst>
+                                            <p:cond delay="0"/>
+                                          </p:stCondLst>
+                                        </p:cTn>
+                                        <p:tgtEl>
+                                          <p:spTgt spid="3">
+                                            <p:txEl>
+                                              <p:pRg st="5" end="5"/>
+                                            </p:txEl>
+                                          </p:spTgt>
+                                        </p:tgtEl>
+                                        <p:attrNameLst>
+                                          <p:attrName>style.visibility</p:attrName>
+                                        </p:attrNameLst>
+                                      </p:cBhvr>
+                                      <p:to>
+                                        <p:strVal val="visible"/>
+                                      </p:to>
+                                    </p:set>
+                                  </p:childTnLst>
+                                </p:cTn>
+                              </p:par>
+                            </p:childTnLst>
+                          </p:cTn>
+                        </p:par>
+                      </p:childTnLst>
+                    </p:cTn>
+                  </p:par>
+                </p:childTnLst>
+              </p:cTn>
+              <p:prevCondLst>
+                <p:cond evt="onPrev" delay="0">
+                  <p:tgtEl>
+                    <p:sldTgt/>
+                  </p:tgtEl>
+                </p:cond>
+              </p:prevCondLst>
+              <p:nextCondLst>
+                <p:cond evt="onNext" delay="0">
+                  <p:tgtEl>
+                    <p:sldTgt/>
+                  </p:tgtEl>
+                </p:cond>
+              </p:nextCondLst>
+            </p:seq>
+          </p:childTnLst>
+        </p:cTn>
+      </p:par>
+    </p:tnLst>
+    <p:bldLst>
+      <p:bldP spid="3" grpId="0" build="p"/>
+    </p:bldLst>
+  </p:timing>
 </p:sld>
 </file>
 
@@ -8689,6 +9290,18 @@
   <p:clrMapOvr>
     <a:masterClrMapping/>
   </p:clrMapOvr>
+  <mc:AlternateContent xmlns:mc="http://schemas.openxmlformats.org/markup-compatibility/2006">
+    <mc:Choice xmlns:p159="http://schemas.microsoft.com/office/powerpoint/2015/09/main" Requires="p159">
+      <p:transition xmlns:p14="http://schemas.microsoft.com/office/powerpoint/2010/main" spd="slow" p14:dur="2000">
+        <p159:morph option="byObject"/>
+      </p:transition>
+    </mc:Choice>
+    <mc:Fallback>
+      <p:transition spd="slow">
+        <p:fade/>
+      </p:transition>
+    </mc:Fallback>
+  </mc:AlternateContent>
 </p:sld>
 </file>
 
@@ -8969,7 +9582,7 @@
               <a:buNone/>
             </a:pPr>
             <a:r>
-              <a:rPr lang="en-US" sz="2800">
+              <a:rPr lang="en-US" sz="2800" dirty="0">
                 <a:latin typeface="Ubuntu" panose="020B0504030602030204" charset="0"/>
                 <a:cs typeface="Ubuntu" panose="020B0504030602030204" charset="0"/>
               </a:rPr>
@@ -9204,7 +9817,7 @@
               <a:buNone/>
             </a:pPr>
             <a:r>
-              <a:rPr lang="en-US" sz="2800">
+              <a:rPr lang="en-US" sz="2800" dirty="0">
                 <a:latin typeface="Ubuntu" panose="020B0504030602030204" charset="0"/>
                 <a:cs typeface="Ubuntu" panose="020B0504030602030204" charset="0"/>
               </a:rPr>
@@ -9423,7 +10036,7 @@
               <a:buNone/>
             </a:pPr>
             <a:r>
-              <a:rPr lang="en-US" sz="2800">
+              <a:rPr lang="en-US" sz="2800" dirty="0">
                 <a:latin typeface="Ubuntu" panose="020B0504030602030204" charset="0"/>
                 <a:cs typeface="Ubuntu" panose="020B0504030602030204" charset="0"/>
               </a:rPr>
@@ -9642,11 +10255,25 @@
               <a:buNone/>
             </a:pPr>
             <a:r>
-              <a:rPr lang="en-US" sz="2000">
+              <a:rPr lang="en-US" sz="2000" dirty="0">
                 <a:latin typeface="Ubuntu" panose="020B0504030602030204" charset="0"/>
                 <a:cs typeface="Ubuntu" panose="020B0504030602030204" charset="0"/>
               </a:rPr>
-              <a:t>Supervise and Unsupervise learning, Hyperparameter tunning, Ensemble Learning, and how to evaluate ML model ...</a:t>
+              <a:t>Supervise and </a:t>
+            </a:r>
+            <a:r>
+              <a:rPr lang="en-US" sz="2000" dirty="0" err="1">
+                <a:latin typeface="Ubuntu" panose="020B0504030602030204" charset="0"/>
+                <a:cs typeface="Ubuntu" panose="020B0504030602030204" charset="0"/>
+              </a:rPr>
+              <a:t>Unsupervise</a:t>
+            </a:r>
+            <a:r>
+              <a:rPr lang="en-US" sz="2000" dirty="0">
+                <a:latin typeface="Ubuntu" panose="020B0504030602030204" charset="0"/>
+                <a:cs typeface="Ubuntu" panose="020B0504030602030204" charset="0"/>
+              </a:rPr>
+              <a:t> learning, Hyperparameter tunning, Ensemble Learning, and how to evaluate ML model ...</a:t>
             </a:r>
           </a:p>
         </p:txBody>
@@ -9656,6 +10283,286 @@
   <p:clrMapOvr>
     <a:masterClrMapping/>
   </p:clrMapOvr>
+  <mc:AlternateContent xmlns:mc="http://schemas.openxmlformats.org/markup-compatibility/2006">
+    <mc:Choice xmlns:p159="http://schemas.microsoft.com/office/powerpoint/2015/09/main" Requires="p159">
+      <p:transition xmlns:p14="http://schemas.microsoft.com/office/powerpoint/2010/main" spd="slow" p14:dur="2000">
+        <p159:morph option="byObject"/>
+      </p:transition>
+    </mc:Choice>
+    <mc:Fallback>
+      <p:transition spd="slow">
+        <p:fade/>
+      </p:transition>
+    </mc:Fallback>
+  </mc:AlternateContent>
+  <p:timing>
+    <p:tnLst>
+      <p:par>
+        <p:cTn id="1" dur="indefinite" restart="never" nodeType="tmRoot">
+          <p:childTnLst>
+            <p:seq concurrent="1" nextAc="seek">
+              <p:cTn id="2" dur="indefinite" nodeType="mainSeq">
+                <p:childTnLst>
+                  <p:par>
+                    <p:cTn id="3" fill="hold">
+                      <p:stCondLst>
+                        <p:cond delay="indefinite"/>
+                      </p:stCondLst>
+                      <p:childTnLst>
+                        <p:par>
+                          <p:cTn id="4" fill="hold">
+                            <p:stCondLst>
+                              <p:cond delay="0"/>
+                            </p:stCondLst>
+                            <p:childTnLst>
+                              <p:par>
+                                <p:cTn id="5" presetID="1" presetClass="entr" presetSubtype="0" fill="hold" grpId="0" nodeType="clickEffect">
+                                  <p:stCondLst>
+                                    <p:cond delay="0"/>
+                                  </p:stCondLst>
+                                  <p:childTnLst>
+                                    <p:set>
+                                      <p:cBhvr>
+                                        <p:cTn id="6" dur="1" fill="hold">
+                                          <p:stCondLst>
+                                            <p:cond delay="0"/>
+                                          </p:stCondLst>
+                                        </p:cTn>
+                                        <p:tgtEl>
+                                          <p:spTgt spid="3">
+                                            <p:txEl>
+                                              <p:pRg st="0" end="0"/>
+                                            </p:txEl>
+                                          </p:spTgt>
+                                        </p:tgtEl>
+                                        <p:attrNameLst>
+                                          <p:attrName>style.visibility</p:attrName>
+                                        </p:attrNameLst>
+                                      </p:cBhvr>
+                                      <p:to>
+                                        <p:strVal val="visible"/>
+                                      </p:to>
+                                    </p:set>
+                                  </p:childTnLst>
+                                </p:cTn>
+                              </p:par>
+                            </p:childTnLst>
+                          </p:cTn>
+                        </p:par>
+                      </p:childTnLst>
+                    </p:cTn>
+                  </p:par>
+                  <p:par>
+                    <p:cTn id="7" fill="hold">
+                      <p:stCondLst>
+                        <p:cond delay="indefinite"/>
+                      </p:stCondLst>
+                      <p:childTnLst>
+                        <p:par>
+                          <p:cTn id="8" fill="hold">
+                            <p:stCondLst>
+                              <p:cond delay="0"/>
+                            </p:stCondLst>
+                            <p:childTnLst>
+                              <p:par>
+                                <p:cTn id="9" presetID="1" presetClass="entr" presetSubtype="0" fill="hold" grpId="0" nodeType="clickEffect">
+                                  <p:stCondLst>
+                                    <p:cond delay="0"/>
+                                  </p:stCondLst>
+                                  <p:childTnLst>
+                                    <p:set>
+                                      <p:cBhvr>
+                                        <p:cTn id="10" dur="1" fill="hold">
+                                          <p:stCondLst>
+                                            <p:cond delay="0"/>
+                                          </p:stCondLst>
+                                        </p:cTn>
+                                        <p:tgtEl>
+                                          <p:spTgt spid="4"/>
+                                        </p:tgtEl>
+                                        <p:attrNameLst>
+                                          <p:attrName>style.visibility</p:attrName>
+                                        </p:attrNameLst>
+                                      </p:cBhvr>
+                                      <p:to>
+                                        <p:strVal val="visible"/>
+                                      </p:to>
+                                    </p:set>
+                                  </p:childTnLst>
+                                </p:cTn>
+                              </p:par>
+                            </p:childTnLst>
+                          </p:cTn>
+                        </p:par>
+                      </p:childTnLst>
+                    </p:cTn>
+                  </p:par>
+                  <p:par>
+                    <p:cTn id="11" fill="hold">
+                      <p:stCondLst>
+                        <p:cond delay="indefinite"/>
+                      </p:stCondLst>
+                      <p:childTnLst>
+                        <p:par>
+                          <p:cTn id="12" fill="hold">
+                            <p:stCondLst>
+                              <p:cond delay="0"/>
+                            </p:stCondLst>
+                            <p:childTnLst>
+                              <p:par>
+                                <p:cTn id="13" presetID="1" presetClass="entr" presetSubtype="0" fill="hold" grpId="0" nodeType="clickEffect">
+                                  <p:stCondLst>
+                                    <p:cond delay="0"/>
+                                  </p:stCondLst>
+                                  <p:childTnLst>
+                                    <p:set>
+                                      <p:cBhvr>
+                                        <p:cTn id="14" dur="1" fill="hold">
+                                          <p:stCondLst>
+                                            <p:cond delay="0"/>
+                                          </p:stCondLst>
+                                        </p:cTn>
+                                        <p:tgtEl>
+                                          <p:spTgt spid="5"/>
+                                        </p:tgtEl>
+                                        <p:attrNameLst>
+                                          <p:attrName>style.visibility</p:attrName>
+                                        </p:attrNameLst>
+                                      </p:cBhvr>
+                                      <p:to>
+                                        <p:strVal val="visible"/>
+                                      </p:to>
+                                    </p:set>
+                                  </p:childTnLst>
+                                </p:cTn>
+                              </p:par>
+                            </p:childTnLst>
+                          </p:cTn>
+                        </p:par>
+                      </p:childTnLst>
+                    </p:cTn>
+                  </p:par>
+                  <p:par>
+                    <p:cTn id="15" fill="hold">
+                      <p:stCondLst>
+                        <p:cond delay="indefinite"/>
+                      </p:stCondLst>
+                      <p:childTnLst>
+                        <p:par>
+                          <p:cTn id="16" fill="hold">
+                            <p:stCondLst>
+                              <p:cond delay="0"/>
+                            </p:stCondLst>
+                            <p:childTnLst>
+                              <p:par>
+                                <p:cTn id="17" presetID="1" presetClass="entr" presetSubtype="0" fill="hold" grpId="0" nodeType="clickEffect">
+                                  <p:stCondLst>
+                                    <p:cond delay="0"/>
+                                  </p:stCondLst>
+                                  <p:childTnLst>
+                                    <p:set>
+                                      <p:cBhvr>
+                                        <p:cTn id="18" dur="1" fill="hold">
+                                          <p:stCondLst>
+                                            <p:cond delay="0"/>
+                                          </p:stCondLst>
+                                        </p:cTn>
+                                        <p:tgtEl>
+                                          <p:spTgt spid="7"/>
+                                        </p:tgtEl>
+                                        <p:attrNameLst>
+                                          <p:attrName>style.visibility</p:attrName>
+                                        </p:attrNameLst>
+                                      </p:cBhvr>
+                                      <p:to>
+                                        <p:strVal val="visible"/>
+                                      </p:to>
+                                    </p:set>
+                                  </p:childTnLst>
+                                </p:cTn>
+                              </p:par>
+                            </p:childTnLst>
+                          </p:cTn>
+                        </p:par>
+                      </p:childTnLst>
+                    </p:cTn>
+                  </p:par>
+                  <p:par>
+                    <p:cTn id="19" fill="hold">
+                      <p:stCondLst>
+                        <p:cond delay="indefinite"/>
+                      </p:stCondLst>
+                      <p:childTnLst>
+                        <p:par>
+                          <p:cTn id="20" fill="hold">
+                            <p:stCondLst>
+                              <p:cond delay="0"/>
+                            </p:stCondLst>
+                            <p:childTnLst>
+                              <p:par>
+                                <p:cTn id="21" presetID="1" presetClass="entr" presetSubtype="0" fill="hold" grpId="0" nodeType="clickEffect">
+                                  <p:stCondLst>
+                                    <p:cond delay="0"/>
+                                  </p:stCondLst>
+                                  <p:childTnLst>
+                                    <p:set>
+                                      <p:cBhvr>
+                                        <p:cTn id="22" dur="1" fill="hold">
+                                          <p:stCondLst>
+                                            <p:cond delay="0"/>
+                                          </p:stCondLst>
+                                        </p:cTn>
+                                        <p:tgtEl>
+                                          <p:spTgt spid="6"/>
+                                        </p:tgtEl>
+                                        <p:attrNameLst>
+                                          <p:attrName>style.visibility</p:attrName>
+                                        </p:attrNameLst>
+                                      </p:cBhvr>
+                                      <p:to>
+                                        <p:strVal val="visible"/>
+                                      </p:to>
+                                    </p:set>
+                                  </p:childTnLst>
+                                </p:cTn>
+                              </p:par>
+                            </p:childTnLst>
+                          </p:cTn>
+                        </p:par>
+                      </p:childTnLst>
+                    </p:cTn>
+                  </p:par>
+                </p:childTnLst>
+              </p:cTn>
+              <p:prevCondLst>
+                <p:cond evt="onPrev" delay="0">
+                  <p:tgtEl>
+                    <p:sldTgt/>
+                  </p:tgtEl>
+                </p:cond>
+              </p:prevCondLst>
+              <p:nextCondLst>
+                <p:cond evt="onNext" delay="0">
+                  <p:tgtEl>
+                    <p:sldTgt/>
+                  </p:tgtEl>
+                </p:cond>
+              </p:nextCondLst>
+            </p:seq>
+          </p:childTnLst>
+        </p:cTn>
+      </p:par>
+    </p:tnLst>
+    <p:bldLst>
+      <p:bldP spid="3" grpId="0" build="p"/>
+      <p:bldGraphic spid="4" grpId="0">
+        <p:bldAsOne/>
+      </p:bldGraphic>
+      <p:bldP spid="5" grpId="0"/>
+      <p:bldP spid="6" grpId="0"/>
+      <p:bldP spid="7" grpId="0"/>
+    </p:bldLst>
+  </p:timing>
 </p:sld>
 </file>
 
@@ -9991,12 +10898,16 @@
   <p:clrMapOvr>
     <a:masterClrMapping/>
   </p:clrMapOvr>
-  <mc:AlternateContent xmlns:mc="http://schemas.openxmlformats.org/markup-compatibility/2006" xmlns:p14="http://schemas.microsoft.com/office/powerpoint/2010/main">
-    <mc:Choice Requires="p14">
-      <p:transition spd="slow" p14:dur="1200"/>
+  <mc:AlternateContent xmlns:mc="http://schemas.openxmlformats.org/markup-compatibility/2006">
+    <mc:Choice xmlns:p159="http://schemas.microsoft.com/office/powerpoint/2015/09/main" Requires="p159">
+      <p:transition xmlns:p14="http://schemas.microsoft.com/office/powerpoint/2010/main" spd="slow" p14:dur="2000">
+        <p159:morph option="byObject"/>
+      </p:transition>
     </mc:Choice>
-    <mc:Fallback xmlns="">
-      <p:transition spd="slow"/>
+    <mc:Fallback>
+      <p:transition spd="slow">
+        <p:fade/>
+      </p:transition>
     </mc:Fallback>
   </mc:AlternateContent>
 </p:sld>
@@ -10493,11 +11404,11 @@
   <p:clrMapOvr>
     <a:masterClrMapping/>
   </p:clrMapOvr>
-  <mc:AlternateContent xmlns:mc="http://schemas.openxmlformats.org/markup-compatibility/2006">
-    <mc:Choice xmlns:p14="http://schemas.microsoft.com/office/powerpoint/2010/main" Requires="p14">
+  <mc:AlternateContent xmlns:mc="http://schemas.openxmlformats.org/markup-compatibility/2006" xmlns:p14="http://schemas.microsoft.com/office/powerpoint/2010/main">
+    <mc:Choice Requires="p14">
       <p:transition spd="slow" p14:dur="1200"/>
     </mc:Choice>
-    <mc:Fallback>
+    <mc:Fallback xmlns="">
       <p:transition spd="slow"/>
     </mc:Fallback>
   </mc:AlternateContent>
@@ -10571,56 +11482,56 @@
               <a:buNone/>
             </a:pPr>
             <a:r>
-              <a:rPr lang="en-US" sz="2400">
+              <a:rPr lang="en-US" sz="2400" dirty="0">
                 <a:latin typeface="Ubuntu" panose="020B0504030602030204" charset="0"/>
                 <a:cs typeface="Ubuntu" panose="020B0504030602030204" charset="0"/>
               </a:rPr>
               <a:t>Data science is the application of</a:t>
             </a:r>
             <a:r>
-              <a:rPr lang="ug-CN" altLang="en-US" sz="2400">
+              <a:rPr lang="ug-CN" altLang="en-US" sz="2400" dirty="0">
                 <a:latin typeface="Ubuntu" panose="020B0504030602030204" charset="0"/>
                 <a:cs typeface="Ubuntu" panose="020B0504030602030204" charset="0"/>
               </a:rPr>
               <a:t> </a:t>
             </a:r>
             <a:r>
-              <a:rPr lang="en-US" sz="2400">
+              <a:rPr lang="en-US" sz="2400" dirty="0">
                 <a:latin typeface="Ubuntu" panose="020B0504030602030204" charset="0"/>
                 <a:cs typeface="Ubuntu" panose="020B0504030602030204" charset="0"/>
               </a:rPr>
               <a:t>computational and statistical</a:t>
             </a:r>
             <a:r>
-              <a:rPr lang="ug-CN" altLang="en-US" sz="2400">
+              <a:rPr lang="ug-CN" altLang="en-US" sz="2400" dirty="0">
                 <a:latin typeface="Ubuntu" panose="020B0504030602030204" charset="0"/>
                 <a:cs typeface="Ubuntu" panose="020B0504030602030204" charset="0"/>
               </a:rPr>
               <a:t> </a:t>
             </a:r>
             <a:r>
-              <a:rPr lang="en-US" sz="2400">
+              <a:rPr lang="en-US" sz="2400" dirty="0">
                 <a:latin typeface="Ubuntu" panose="020B0504030602030204" charset="0"/>
                 <a:cs typeface="Ubuntu" panose="020B0504030602030204" charset="0"/>
               </a:rPr>
               <a:t>techniques to address or gain insight</a:t>
             </a:r>
             <a:r>
-              <a:rPr lang="ug-CN" altLang="en-US" sz="2400">
+              <a:rPr lang="ug-CN" altLang="en-US" sz="2400" dirty="0">
                 <a:latin typeface="Ubuntu" panose="020B0504030602030204" charset="0"/>
                 <a:cs typeface="Ubuntu" panose="020B0504030602030204" charset="0"/>
               </a:rPr>
               <a:t> </a:t>
             </a:r>
             <a:r>
-              <a:rPr lang="en-US" sz="2400">
+              <a:rPr lang="en-US" sz="2400" dirty="0">
                 <a:latin typeface="Ubuntu" panose="020B0504030602030204" charset="0"/>
                 <a:cs typeface="Ubuntu" panose="020B0504030602030204" charset="0"/>
               </a:rPr>
               <a:t>into some problem in the real world</a:t>
             </a:r>
             <a:r>
-              <a:rPr lang="en-US" altLang="ug-CN" sz="2400">
+              <a:rPr lang="en-US" altLang="ug-CN" sz="2400" dirty="0">
                 <a:latin typeface="Ubuntu" panose="020B0504030602030204" charset="0"/>
                 <a:cs typeface="Ubuntu" panose="020B0504030602030204" charset="0"/>
               </a:rPr>
@@ -10631,7 +11542,7 @@
             <a:pPr marL="0" indent="0" algn="l">
               <a:buNone/>
             </a:pPr>
-            <a:endParaRPr lang="en-US" altLang="ug-CN" sz="2400">
+            <a:endParaRPr lang="en-US" altLang="ug-CN" sz="2400" dirty="0">
               <a:latin typeface="Ubuntu" panose="020B0504030602030204" charset="0"/>
               <a:cs typeface="Ubuntu" panose="020B0504030602030204" charset="0"/>
             </a:endParaRPr>
@@ -10641,7 +11552,7 @@
               <a:buNone/>
             </a:pPr>
             <a:r>
-              <a:rPr lang="en-US" altLang="ug-CN" sz="2400">
+              <a:rPr lang="en-US" altLang="ug-CN" sz="2400" dirty="0">
                 <a:latin typeface="Ubuntu" panose="020B0504030602030204" charset="0"/>
                 <a:cs typeface="Ubuntu" panose="020B0504030602030204" charset="0"/>
               </a:rPr>
@@ -10653,14 +11564,14 @@
               <a:buNone/>
             </a:pPr>
             <a:r>
-              <a:rPr lang="ug-CN" altLang="en-US" sz="2400">
+              <a:rPr lang="ug-CN" altLang="en-US" sz="2400" dirty="0">
                 <a:latin typeface="Ubuntu" panose="020B0504030602030204" charset="0"/>
                 <a:cs typeface="Ubuntu" panose="020B0504030602030204" charset="0"/>
               </a:rPr>
               <a:t>		   </a:t>
             </a:r>
             <a:r>
-              <a:rPr lang="en-US" altLang="ug-CN" sz="2400">
+              <a:rPr lang="en-US" altLang="ug-CN" sz="2400" dirty="0">
                 <a:latin typeface="Ubuntu" panose="020B0504030602030204" charset="0"/>
                 <a:cs typeface="Ubuntu" panose="020B0504030602030204" charset="0"/>
               </a:rPr>
@@ -10672,14 +11583,14 @@
               <a:buNone/>
             </a:pPr>
             <a:r>
-              <a:rPr lang="ug-CN" altLang="en-US" sz="2400">
+              <a:rPr lang="ug-CN" altLang="en-US" sz="2400" dirty="0">
                 <a:latin typeface="Ubuntu" panose="020B0504030602030204" charset="0"/>
                 <a:cs typeface="Ubuntu" panose="020B0504030602030204" charset="0"/>
               </a:rPr>
               <a:t>		   </a:t>
             </a:r>
             <a:r>
-              <a:rPr lang="en-US" altLang="ug-CN" sz="2400">
+              <a:rPr lang="en-US" altLang="ug-CN" sz="2400" dirty="0">
                 <a:latin typeface="Ubuntu" panose="020B0504030602030204" charset="0"/>
                 <a:cs typeface="Ubuntu" panose="020B0504030602030204" charset="0"/>
               </a:rPr>
@@ -10691,14 +11602,14 @@
               <a:buNone/>
             </a:pPr>
             <a:r>
-              <a:rPr lang="ug-CN" altLang="en-US" sz="2400">
+              <a:rPr lang="ug-CN" altLang="en-US" sz="2400" dirty="0">
                 <a:latin typeface="Ubuntu" panose="020B0504030602030204" charset="0"/>
                 <a:cs typeface="Ubuntu" panose="020B0504030602030204" charset="0"/>
               </a:rPr>
               <a:t>		   </a:t>
             </a:r>
             <a:r>
-              <a:rPr lang="en-US" altLang="ug-CN" sz="2400">
+              <a:rPr lang="en-US" altLang="ug-CN" sz="2400" dirty="0">
                 <a:latin typeface="Ubuntu" panose="020B0504030602030204" charset="0"/>
                 <a:cs typeface="Ubuntu" panose="020B0504030602030204" charset="0"/>
               </a:rPr>
@@ -10710,14 +11621,14 @@
               <a:buNone/>
             </a:pPr>
             <a:r>
-              <a:rPr lang="ug-CN" altLang="en-US" sz="2400">
+              <a:rPr lang="ug-CN" altLang="en-US" sz="2400" dirty="0">
                 <a:latin typeface="Ubuntu" panose="020B0504030602030204" charset="0"/>
                 <a:cs typeface="Ubuntu" panose="020B0504030602030204" charset="0"/>
               </a:rPr>
               <a:t>		   </a:t>
             </a:r>
             <a:r>
-              <a:rPr lang="en-US" altLang="ug-CN" sz="2400">
+              <a:rPr lang="en-US" altLang="ug-CN" sz="2400" dirty="0">
                 <a:latin typeface="Ubuntu" panose="020B0504030602030204" charset="0"/>
                 <a:cs typeface="Ubuntu" panose="020B0504030602030204" charset="0"/>
               </a:rPr>
@@ -10729,14 +11640,14 @@
               <a:buNone/>
             </a:pPr>
             <a:r>
-              <a:rPr lang="ug-CN" altLang="en-US" sz="2400">
+              <a:rPr lang="ug-CN" altLang="en-US" sz="2400" dirty="0">
                 <a:latin typeface="Ubuntu" panose="020B0504030602030204" charset="0"/>
                 <a:cs typeface="Ubuntu" panose="020B0504030602030204" charset="0"/>
               </a:rPr>
               <a:t>		   </a:t>
             </a:r>
             <a:r>
-              <a:rPr lang="en-US" altLang="ug-CN" sz="2400">
+              <a:rPr lang="en-US" altLang="ug-CN" sz="2400" dirty="0">
                 <a:latin typeface="Ubuntu" panose="020B0504030602030204" charset="0"/>
                 <a:cs typeface="Ubuntu" panose="020B0504030602030204" charset="0"/>
               </a:rPr>
@@ -10748,14 +11659,14 @@
               <a:buNone/>
             </a:pPr>
             <a:r>
-              <a:rPr lang="ug-CN" altLang="en-US" sz="2400">
+              <a:rPr lang="ug-CN" altLang="en-US" sz="2400" dirty="0">
                 <a:latin typeface="Ubuntu" panose="020B0504030602030204" charset="0"/>
                 <a:cs typeface="Ubuntu" panose="020B0504030602030204" charset="0"/>
               </a:rPr>
               <a:t>                             </a:t>
             </a:r>
             <a:r>
-              <a:rPr lang="en-US" altLang="ug-CN" sz="2400">
+              <a:rPr lang="en-US" altLang="ug-CN" sz="2400" dirty="0">
                 <a:latin typeface="Ubuntu" panose="020B0504030602030204" charset="0"/>
                 <a:cs typeface="Ubuntu" panose="020B0504030602030204" charset="0"/>
               </a:rPr>
@@ -10793,6 +11704,488 @@
   <p:clrMapOvr>
     <a:masterClrMapping/>
   </p:clrMapOvr>
+  <mc:AlternateContent xmlns:mc="http://schemas.openxmlformats.org/markup-compatibility/2006">
+    <mc:Choice xmlns:p159="http://schemas.microsoft.com/office/powerpoint/2015/09/main" Requires="p159">
+      <p:transition xmlns:p14="http://schemas.microsoft.com/office/powerpoint/2010/main" spd="slow" p14:dur="2000">
+        <p159:morph option="byObject"/>
+      </p:transition>
+    </mc:Choice>
+    <mc:Fallback>
+      <p:transition spd="slow">
+        <p:fade/>
+      </p:transition>
+    </mc:Fallback>
+  </mc:AlternateContent>
+  <p:timing>
+    <p:tnLst>
+      <p:par>
+        <p:cTn id="1" dur="indefinite" restart="never" nodeType="tmRoot">
+          <p:childTnLst>
+            <p:seq concurrent="1" nextAc="seek">
+              <p:cTn id="2" dur="indefinite" nodeType="mainSeq">
+                <p:childTnLst>
+                  <p:par>
+                    <p:cTn id="3" fill="hold">
+                      <p:stCondLst>
+                        <p:cond delay="indefinite"/>
+                      </p:stCondLst>
+                      <p:childTnLst>
+                        <p:par>
+                          <p:cTn id="4" fill="hold">
+                            <p:stCondLst>
+                              <p:cond delay="0"/>
+                            </p:stCondLst>
+                            <p:childTnLst>
+                              <p:par>
+                                <p:cTn id="5" presetID="1" presetClass="entr" presetSubtype="0" fill="hold" grpId="0" nodeType="clickEffect">
+                                  <p:stCondLst>
+                                    <p:cond delay="0"/>
+                                  </p:stCondLst>
+                                  <p:childTnLst>
+                                    <p:set>
+                                      <p:cBhvr>
+                                        <p:cTn id="6" dur="1" fill="hold">
+                                          <p:stCondLst>
+                                            <p:cond delay="0"/>
+                                          </p:stCondLst>
+                                        </p:cTn>
+                                        <p:tgtEl>
+                                          <p:spTgt spid="3">
+                                            <p:txEl>
+                                              <p:pRg st="0" end="0"/>
+                                            </p:txEl>
+                                          </p:spTgt>
+                                        </p:tgtEl>
+                                        <p:attrNameLst>
+                                          <p:attrName>style.visibility</p:attrName>
+                                        </p:attrNameLst>
+                                      </p:cBhvr>
+                                      <p:to>
+                                        <p:strVal val="visible"/>
+                                      </p:to>
+                                    </p:set>
+                                  </p:childTnLst>
+                                </p:cTn>
+                              </p:par>
+                            </p:childTnLst>
+                          </p:cTn>
+                        </p:par>
+                      </p:childTnLst>
+                    </p:cTn>
+                  </p:par>
+                  <p:par>
+                    <p:cTn id="7" fill="hold">
+                      <p:stCondLst>
+                        <p:cond delay="indefinite"/>
+                      </p:stCondLst>
+                      <p:childTnLst>
+                        <p:par>
+                          <p:cTn id="8" fill="hold">
+                            <p:stCondLst>
+                              <p:cond delay="0"/>
+                            </p:stCondLst>
+                            <p:childTnLst>
+                              <p:par>
+                                <p:cTn id="9" presetID="1" presetClass="entr" presetSubtype="0" fill="hold" grpId="0" nodeType="clickEffect">
+                                  <p:stCondLst>
+                                    <p:cond delay="0"/>
+                                  </p:stCondLst>
+                                  <p:childTnLst>
+                                    <p:set>
+                                      <p:cBhvr>
+                                        <p:cTn id="10" dur="1" fill="hold">
+                                          <p:stCondLst>
+                                            <p:cond delay="0"/>
+                                          </p:stCondLst>
+                                        </p:cTn>
+                                        <p:tgtEl>
+                                          <p:spTgt spid="3">
+                                            <p:txEl>
+                                              <p:pRg st="2" end="2"/>
+                                            </p:txEl>
+                                          </p:spTgt>
+                                        </p:tgtEl>
+                                        <p:attrNameLst>
+                                          <p:attrName>style.visibility</p:attrName>
+                                        </p:attrNameLst>
+                                      </p:cBhvr>
+                                      <p:to>
+                                        <p:strVal val="visible"/>
+                                      </p:to>
+                                    </p:set>
+                                  </p:childTnLst>
+                                </p:cTn>
+                              </p:par>
+                            </p:childTnLst>
+                          </p:cTn>
+                        </p:par>
+                      </p:childTnLst>
+                    </p:cTn>
+                  </p:par>
+                  <p:par>
+                    <p:cTn id="11" fill="hold">
+                      <p:stCondLst>
+                        <p:cond delay="indefinite"/>
+                      </p:stCondLst>
+                      <p:childTnLst>
+                        <p:par>
+                          <p:cTn id="12" fill="hold">
+                            <p:stCondLst>
+                              <p:cond delay="0"/>
+                            </p:stCondLst>
+                            <p:childTnLst>
+                              <p:par>
+                                <p:cTn id="13" presetID="1" presetClass="entr" presetSubtype="0" fill="hold" grpId="0" nodeType="clickEffect">
+                                  <p:stCondLst>
+                                    <p:cond delay="0"/>
+                                  </p:stCondLst>
+                                  <p:childTnLst>
+                                    <p:set>
+                                      <p:cBhvr>
+                                        <p:cTn id="14" dur="1" fill="hold">
+                                          <p:stCondLst>
+                                            <p:cond delay="0"/>
+                                          </p:stCondLst>
+                                        </p:cTn>
+                                        <p:tgtEl>
+                                          <p:spTgt spid="3">
+                                            <p:txEl>
+                                              <p:pRg st="3" end="3"/>
+                                            </p:txEl>
+                                          </p:spTgt>
+                                        </p:tgtEl>
+                                        <p:attrNameLst>
+                                          <p:attrName>style.visibility</p:attrName>
+                                        </p:attrNameLst>
+                                      </p:cBhvr>
+                                      <p:to>
+                                        <p:strVal val="visible"/>
+                                      </p:to>
+                                    </p:set>
+                                  </p:childTnLst>
+                                </p:cTn>
+                              </p:par>
+                            </p:childTnLst>
+                          </p:cTn>
+                        </p:par>
+                      </p:childTnLst>
+                    </p:cTn>
+                  </p:par>
+                  <p:par>
+                    <p:cTn id="15" fill="hold">
+                      <p:stCondLst>
+                        <p:cond delay="indefinite"/>
+                      </p:stCondLst>
+                      <p:childTnLst>
+                        <p:par>
+                          <p:cTn id="16" fill="hold">
+                            <p:stCondLst>
+                              <p:cond delay="0"/>
+                            </p:stCondLst>
+                            <p:childTnLst>
+                              <p:par>
+                                <p:cTn id="17" presetID="1" presetClass="entr" presetSubtype="0" fill="hold" grpId="0" nodeType="clickEffect">
+                                  <p:stCondLst>
+                                    <p:cond delay="0"/>
+                                  </p:stCondLst>
+                                  <p:childTnLst>
+                                    <p:set>
+                                      <p:cBhvr>
+                                        <p:cTn id="18" dur="1" fill="hold">
+                                          <p:stCondLst>
+                                            <p:cond delay="0"/>
+                                          </p:stCondLst>
+                                        </p:cTn>
+                                        <p:tgtEl>
+                                          <p:spTgt spid="3">
+                                            <p:txEl>
+                                              <p:pRg st="4" end="4"/>
+                                            </p:txEl>
+                                          </p:spTgt>
+                                        </p:tgtEl>
+                                        <p:attrNameLst>
+                                          <p:attrName>style.visibility</p:attrName>
+                                        </p:attrNameLst>
+                                      </p:cBhvr>
+                                      <p:to>
+                                        <p:strVal val="visible"/>
+                                      </p:to>
+                                    </p:set>
+                                  </p:childTnLst>
+                                </p:cTn>
+                              </p:par>
+                            </p:childTnLst>
+                          </p:cTn>
+                        </p:par>
+                      </p:childTnLst>
+                    </p:cTn>
+                  </p:par>
+                  <p:par>
+                    <p:cTn id="19" fill="hold">
+                      <p:stCondLst>
+                        <p:cond delay="indefinite"/>
+                      </p:stCondLst>
+                      <p:childTnLst>
+                        <p:par>
+                          <p:cTn id="20" fill="hold">
+                            <p:stCondLst>
+                              <p:cond delay="0"/>
+                            </p:stCondLst>
+                            <p:childTnLst>
+                              <p:par>
+                                <p:cTn id="21" presetID="1" presetClass="entr" presetSubtype="0" fill="hold" grpId="0" nodeType="clickEffect">
+                                  <p:stCondLst>
+                                    <p:cond delay="0"/>
+                                  </p:stCondLst>
+                                  <p:childTnLst>
+                                    <p:set>
+                                      <p:cBhvr>
+                                        <p:cTn id="22" dur="1" fill="hold">
+                                          <p:stCondLst>
+                                            <p:cond delay="0"/>
+                                          </p:stCondLst>
+                                        </p:cTn>
+                                        <p:tgtEl>
+                                          <p:spTgt spid="3">
+                                            <p:txEl>
+                                              <p:pRg st="5" end="5"/>
+                                            </p:txEl>
+                                          </p:spTgt>
+                                        </p:tgtEl>
+                                        <p:attrNameLst>
+                                          <p:attrName>style.visibility</p:attrName>
+                                        </p:attrNameLst>
+                                      </p:cBhvr>
+                                      <p:to>
+                                        <p:strVal val="visible"/>
+                                      </p:to>
+                                    </p:set>
+                                  </p:childTnLst>
+                                </p:cTn>
+                              </p:par>
+                            </p:childTnLst>
+                          </p:cTn>
+                        </p:par>
+                      </p:childTnLst>
+                    </p:cTn>
+                  </p:par>
+                  <p:par>
+                    <p:cTn id="23" fill="hold">
+                      <p:stCondLst>
+                        <p:cond delay="indefinite"/>
+                      </p:stCondLst>
+                      <p:childTnLst>
+                        <p:par>
+                          <p:cTn id="24" fill="hold">
+                            <p:stCondLst>
+                              <p:cond delay="0"/>
+                            </p:stCondLst>
+                            <p:childTnLst>
+                              <p:par>
+                                <p:cTn id="25" presetID="1" presetClass="entr" presetSubtype="0" fill="hold" grpId="0" nodeType="clickEffect">
+                                  <p:stCondLst>
+                                    <p:cond delay="0"/>
+                                  </p:stCondLst>
+                                  <p:childTnLst>
+                                    <p:set>
+                                      <p:cBhvr>
+                                        <p:cTn id="26" dur="1" fill="hold">
+                                          <p:stCondLst>
+                                            <p:cond delay="0"/>
+                                          </p:stCondLst>
+                                        </p:cTn>
+                                        <p:tgtEl>
+                                          <p:spTgt spid="3">
+                                            <p:txEl>
+                                              <p:pRg st="6" end="6"/>
+                                            </p:txEl>
+                                          </p:spTgt>
+                                        </p:tgtEl>
+                                        <p:attrNameLst>
+                                          <p:attrName>style.visibility</p:attrName>
+                                        </p:attrNameLst>
+                                      </p:cBhvr>
+                                      <p:to>
+                                        <p:strVal val="visible"/>
+                                      </p:to>
+                                    </p:set>
+                                  </p:childTnLst>
+                                </p:cTn>
+                              </p:par>
+                            </p:childTnLst>
+                          </p:cTn>
+                        </p:par>
+                      </p:childTnLst>
+                    </p:cTn>
+                  </p:par>
+                  <p:par>
+                    <p:cTn id="27" fill="hold">
+                      <p:stCondLst>
+                        <p:cond delay="indefinite"/>
+                      </p:stCondLst>
+                      <p:childTnLst>
+                        <p:par>
+                          <p:cTn id="28" fill="hold">
+                            <p:stCondLst>
+                              <p:cond delay="0"/>
+                            </p:stCondLst>
+                            <p:childTnLst>
+                              <p:par>
+                                <p:cTn id="29" presetID="1" presetClass="entr" presetSubtype="0" fill="hold" grpId="0" nodeType="clickEffect">
+                                  <p:stCondLst>
+                                    <p:cond delay="0"/>
+                                  </p:stCondLst>
+                                  <p:childTnLst>
+                                    <p:set>
+                                      <p:cBhvr>
+                                        <p:cTn id="30" dur="1" fill="hold">
+                                          <p:stCondLst>
+                                            <p:cond delay="0"/>
+                                          </p:stCondLst>
+                                        </p:cTn>
+                                        <p:tgtEl>
+                                          <p:spTgt spid="3">
+                                            <p:txEl>
+                                              <p:pRg st="7" end="7"/>
+                                            </p:txEl>
+                                          </p:spTgt>
+                                        </p:tgtEl>
+                                        <p:attrNameLst>
+                                          <p:attrName>style.visibility</p:attrName>
+                                        </p:attrNameLst>
+                                      </p:cBhvr>
+                                      <p:to>
+                                        <p:strVal val="visible"/>
+                                      </p:to>
+                                    </p:set>
+                                  </p:childTnLst>
+                                </p:cTn>
+                              </p:par>
+                            </p:childTnLst>
+                          </p:cTn>
+                        </p:par>
+                      </p:childTnLst>
+                    </p:cTn>
+                  </p:par>
+                  <p:par>
+                    <p:cTn id="31" fill="hold">
+                      <p:stCondLst>
+                        <p:cond delay="indefinite"/>
+                      </p:stCondLst>
+                      <p:childTnLst>
+                        <p:par>
+                          <p:cTn id="32" fill="hold">
+                            <p:stCondLst>
+                              <p:cond delay="0"/>
+                            </p:stCondLst>
+                            <p:childTnLst>
+                              <p:par>
+                                <p:cTn id="33" presetID="1" presetClass="entr" presetSubtype="0" fill="hold" grpId="0" nodeType="clickEffect">
+                                  <p:stCondLst>
+                                    <p:cond delay="0"/>
+                                  </p:stCondLst>
+                                  <p:childTnLst>
+                                    <p:set>
+                                      <p:cBhvr>
+                                        <p:cTn id="34" dur="1" fill="hold">
+                                          <p:stCondLst>
+                                            <p:cond delay="0"/>
+                                          </p:stCondLst>
+                                        </p:cTn>
+                                        <p:tgtEl>
+                                          <p:spTgt spid="3">
+                                            <p:txEl>
+                                              <p:pRg st="8" end="8"/>
+                                            </p:txEl>
+                                          </p:spTgt>
+                                        </p:tgtEl>
+                                        <p:attrNameLst>
+                                          <p:attrName>style.visibility</p:attrName>
+                                        </p:attrNameLst>
+                                      </p:cBhvr>
+                                      <p:to>
+                                        <p:strVal val="visible"/>
+                                      </p:to>
+                                    </p:set>
+                                  </p:childTnLst>
+                                </p:cTn>
+                              </p:par>
+                            </p:childTnLst>
+                          </p:cTn>
+                        </p:par>
+                      </p:childTnLst>
+                    </p:cTn>
+                  </p:par>
+                  <p:par>
+                    <p:cTn id="35" fill="hold">
+                      <p:stCondLst>
+                        <p:cond delay="indefinite"/>
+                      </p:stCondLst>
+                      <p:childTnLst>
+                        <p:par>
+                          <p:cTn id="36" fill="hold">
+                            <p:stCondLst>
+                              <p:cond delay="0"/>
+                            </p:stCondLst>
+                            <p:childTnLst>
+                              <p:par>
+                                <p:cTn id="37" presetID="1" presetClass="entr" presetSubtype="0" fill="hold" nodeType="clickEffect">
+                                  <p:stCondLst>
+                                    <p:cond delay="0"/>
+                                  </p:stCondLst>
+                                  <p:childTnLst>
+                                    <p:set>
+                                      <p:cBhvr>
+                                        <p:cTn id="38" dur="1" fill="hold">
+                                          <p:stCondLst>
+                                            <p:cond delay="0"/>
+                                          </p:stCondLst>
+                                        </p:cTn>
+                                        <p:tgtEl>
+                                          <p:spTgt spid="4"/>
+                                        </p:tgtEl>
+                                        <p:attrNameLst>
+                                          <p:attrName>style.visibility</p:attrName>
+                                        </p:attrNameLst>
+                                      </p:cBhvr>
+                                      <p:to>
+                                        <p:strVal val="visible"/>
+                                      </p:to>
+                                    </p:set>
+                                  </p:childTnLst>
+                                </p:cTn>
+                              </p:par>
+                            </p:childTnLst>
+                          </p:cTn>
+                        </p:par>
+                      </p:childTnLst>
+                    </p:cTn>
+                  </p:par>
+                </p:childTnLst>
+              </p:cTn>
+              <p:prevCondLst>
+                <p:cond evt="onPrev" delay="0">
+                  <p:tgtEl>
+                    <p:sldTgt/>
+                  </p:tgtEl>
+                </p:cond>
+              </p:prevCondLst>
+              <p:nextCondLst>
+                <p:cond evt="onNext" delay="0">
+                  <p:tgtEl>
+                    <p:sldTgt/>
+                  </p:tgtEl>
+                </p:cond>
+              </p:nextCondLst>
+            </p:seq>
+          </p:childTnLst>
+        </p:cTn>
+      </p:par>
+    </p:tnLst>
+    <p:bldLst>
+      <p:bldP spid="3" grpId="0" build="p"/>
+    </p:bldLst>
+  </p:timing>
 </p:sld>
 </file>
 
@@ -10856,17 +12249,17 @@
           <a:p>
             <a:pPr algn="l"/>
             <a:r>
-              <a:rPr lang="en-US" sz="2400">
+              <a:rPr lang="en-US" sz="2400" dirty="0">
                 <a:latin typeface="Ubuntu" panose="020B0504030602030204" charset="0"/>
                 <a:cs typeface="Ubuntu" panose="020B0504030602030204" charset="0"/>
               </a:rPr>
-              <a:t>Machine learning involves computation and statistics, but has not (traditionally) been very concerned about answering scientific questions.</a:t>
+              <a:t>Machine learning involves computation and statistics but has not (traditionally) been very concerned about answering scientific questions.</a:t>
             </a:r>
           </a:p>
           <a:p>
             <a:pPr algn="l"/>
             <a:r>
-              <a:rPr lang="en-US" sz="2400">
+              <a:rPr lang="en-US" sz="2400" dirty="0">
                 <a:latin typeface="Ubuntu" panose="020B0504030602030204" charset="0"/>
                 <a:cs typeface="Ubuntu" panose="020B0504030602030204" charset="0"/>
               </a:rPr>
@@ -10876,7 +12269,7 @@
           <a:p>
             <a:pPr algn="l"/>
             <a:r>
-              <a:rPr lang="en-US" sz="2400">
+              <a:rPr lang="en-US" sz="2400" dirty="0">
                 <a:latin typeface="Ubuntu" panose="020B0504030602030204" charset="0"/>
                 <a:cs typeface="Ubuntu" panose="020B0504030602030204" charset="0"/>
               </a:rPr>
@@ -10890,6 +12283,198 @@
   <p:clrMapOvr>
     <a:masterClrMapping/>
   </p:clrMapOvr>
+  <mc:AlternateContent xmlns:mc="http://schemas.openxmlformats.org/markup-compatibility/2006">
+    <mc:Choice xmlns:p159="http://schemas.microsoft.com/office/powerpoint/2015/09/main" Requires="p159">
+      <p:transition xmlns:p14="http://schemas.microsoft.com/office/powerpoint/2010/main" spd="slow" p14:dur="2000">
+        <p159:morph option="byObject"/>
+      </p:transition>
+    </mc:Choice>
+    <mc:Fallback>
+      <p:transition spd="slow">
+        <p:fade/>
+      </p:transition>
+    </mc:Fallback>
+  </mc:AlternateContent>
+  <p:timing>
+    <p:tnLst>
+      <p:par>
+        <p:cTn id="1" dur="indefinite" restart="never" nodeType="tmRoot">
+          <p:childTnLst>
+            <p:seq concurrent="1" nextAc="seek">
+              <p:cTn id="2" dur="indefinite" nodeType="mainSeq">
+                <p:childTnLst>
+                  <p:par>
+                    <p:cTn id="3" fill="hold">
+                      <p:stCondLst>
+                        <p:cond delay="indefinite"/>
+                      </p:stCondLst>
+                      <p:childTnLst>
+                        <p:par>
+                          <p:cTn id="4" fill="hold">
+                            <p:stCondLst>
+                              <p:cond delay="0"/>
+                            </p:stCondLst>
+                            <p:childTnLst>
+                              <p:par>
+                                <p:cTn id="5" presetID="1" presetClass="entr" presetSubtype="0" fill="hold" grpId="0" nodeType="clickEffect">
+                                  <p:stCondLst>
+                                    <p:cond delay="0"/>
+                                  </p:stCondLst>
+                                  <p:childTnLst>
+                                    <p:set>
+                                      <p:cBhvr>
+                                        <p:cTn id="6" dur="1" fill="hold">
+                                          <p:stCondLst>
+                                            <p:cond delay="0"/>
+                                          </p:stCondLst>
+                                        </p:cTn>
+                                        <p:tgtEl>
+                                          <p:spTgt spid="3">
+                                            <p:txEl>
+                                              <p:pRg st="0" end="0"/>
+                                            </p:txEl>
+                                          </p:spTgt>
+                                        </p:tgtEl>
+                                        <p:attrNameLst>
+                                          <p:attrName>style.visibility</p:attrName>
+                                        </p:attrNameLst>
+                                      </p:cBhvr>
+                                      <p:to>
+                                        <p:strVal val="visible"/>
+                                      </p:to>
+                                    </p:set>
+                                  </p:childTnLst>
+                                </p:cTn>
+                              </p:par>
+                            </p:childTnLst>
+                          </p:cTn>
+                        </p:par>
+                      </p:childTnLst>
+                    </p:cTn>
+                  </p:par>
+                  <p:par>
+                    <p:cTn id="7" fill="hold">
+                      <p:stCondLst>
+                        <p:cond delay="indefinite"/>
+                      </p:stCondLst>
+                      <p:childTnLst>
+                        <p:par>
+                          <p:cTn id="8" fill="hold">
+                            <p:stCondLst>
+                              <p:cond delay="0"/>
+                            </p:stCondLst>
+                            <p:childTnLst>
+                              <p:par>
+                                <p:cTn id="9" presetID="1" presetClass="entr" presetSubtype="0" fill="hold" grpId="0" nodeType="clickEffect">
+                                  <p:stCondLst>
+                                    <p:cond delay="0"/>
+                                  </p:stCondLst>
+                                  <p:childTnLst>
+                                    <p:set>
+                                      <p:cBhvr>
+                                        <p:cTn id="10" dur="1" fill="hold">
+                                          <p:stCondLst>
+                                            <p:cond delay="0"/>
+                                          </p:stCondLst>
+                                        </p:cTn>
+                                        <p:tgtEl>
+                                          <p:spTgt spid="3">
+                                            <p:txEl>
+                                              <p:pRg st="1" end="1"/>
+                                            </p:txEl>
+                                          </p:spTgt>
+                                        </p:tgtEl>
+                                        <p:attrNameLst>
+                                          <p:attrName>style.visibility</p:attrName>
+                                        </p:attrNameLst>
+                                      </p:cBhvr>
+                                      <p:to>
+                                        <p:strVal val="visible"/>
+                                      </p:to>
+                                    </p:set>
+                                  </p:childTnLst>
+                                </p:cTn>
+                              </p:par>
+                            </p:childTnLst>
+                          </p:cTn>
+                        </p:par>
+                      </p:childTnLst>
+                    </p:cTn>
+                  </p:par>
+                  <p:par>
+                    <p:cTn id="11" fill="hold">
+                      <p:stCondLst>
+                        <p:cond delay="indefinite"/>
+                      </p:stCondLst>
+                      <p:childTnLst>
+                        <p:par>
+                          <p:cTn id="12" fill="hold">
+                            <p:stCondLst>
+                              <p:cond delay="0"/>
+                            </p:stCondLst>
+                            <p:childTnLst>
+                              <p:par>
+                                <p:cTn id="13" presetID="1" presetClass="entr" presetSubtype="0" fill="hold" grpId="0" nodeType="clickEffect">
+                                  <p:stCondLst>
+                                    <p:cond delay="0"/>
+                                  </p:stCondLst>
+                                  <p:childTnLst>
+                                    <p:set>
+                                      <p:cBhvr>
+                                        <p:cTn id="14" dur="1" fill="hold">
+                                          <p:stCondLst>
+                                            <p:cond delay="0"/>
+                                          </p:stCondLst>
+                                        </p:cTn>
+                                        <p:tgtEl>
+                                          <p:spTgt spid="3">
+                                            <p:txEl>
+                                              <p:pRg st="2" end="2"/>
+                                            </p:txEl>
+                                          </p:spTgt>
+                                        </p:tgtEl>
+                                        <p:attrNameLst>
+                                          <p:attrName>style.visibility</p:attrName>
+                                        </p:attrNameLst>
+                                      </p:cBhvr>
+                                      <p:to>
+                                        <p:strVal val="visible"/>
+                                      </p:to>
+                                    </p:set>
+                                  </p:childTnLst>
+                                </p:cTn>
+                              </p:par>
+                            </p:childTnLst>
+                          </p:cTn>
+                        </p:par>
+                      </p:childTnLst>
+                    </p:cTn>
+                  </p:par>
+                </p:childTnLst>
+              </p:cTn>
+              <p:prevCondLst>
+                <p:cond evt="onPrev" delay="0">
+                  <p:tgtEl>
+                    <p:sldTgt/>
+                  </p:tgtEl>
+                </p:cond>
+              </p:prevCondLst>
+              <p:nextCondLst>
+                <p:cond evt="onNext" delay="0">
+                  <p:tgtEl>
+                    <p:sldTgt/>
+                  </p:tgtEl>
+                </p:cond>
+              </p:nextCondLst>
+            </p:seq>
+          </p:childTnLst>
+        </p:cTn>
+      </p:par>
+    </p:tnLst>
+    <p:bldLst>
+      <p:bldP spid="3" grpId="0" build="p"/>
+    </p:bldLst>
+  </p:timing>
 </p:sld>
 </file>
 
@@ -10958,7 +12543,7 @@
           <a:p>
             <a:pPr algn="l"/>
             <a:r>
-              <a:rPr lang="en-US" sz="2400">
+              <a:rPr lang="en-US" sz="2400" dirty="0">
                 <a:latin typeface="Ubuntu" panose="020B0504030602030204" charset="0"/>
                 <a:cs typeface="Ubuntu" panose="020B0504030602030204" charset="0"/>
               </a:rPr>
@@ -10968,7 +12553,7 @@
           <a:p>
             <a:pPr algn="l"/>
             <a:r>
-              <a:rPr lang="en-US" sz="2400">
+              <a:rPr lang="en-US" sz="2400" dirty="0">
                 <a:latin typeface="Ubuntu" panose="020B0504030602030204" charset="0"/>
                 <a:cs typeface="Ubuntu" panose="020B0504030602030204" charset="0"/>
               </a:rPr>
@@ -10978,7 +12563,7 @@
           <a:p>
             <a:pPr algn="l"/>
             <a:r>
-              <a:rPr lang="en-US" sz="2400">
+              <a:rPr lang="en-US" sz="2400" dirty="0">
                 <a:latin typeface="Ubuntu" panose="020B0504030602030204" charset="0"/>
                 <a:cs typeface="Ubuntu" panose="020B0504030602030204" charset="0"/>
               </a:rPr>
@@ -11016,6 +12601,198 @@
   <p:clrMapOvr>
     <a:masterClrMapping/>
   </p:clrMapOvr>
+  <mc:AlternateContent xmlns:mc="http://schemas.openxmlformats.org/markup-compatibility/2006">
+    <mc:Choice xmlns:p159="http://schemas.microsoft.com/office/powerpoint/2015/09/main" Requires="p159">
+      <p:transition xmlns:p14="http://schemas.microsoft.com/office/powerpoint/2010/main" spd="slow" p14:dur="2000">
+        <p159:morph option="byObject"/>
+      </p:transition>
+    </mc:Choice>
+    <mc:Fallback>
+      <p:transition spd="slow">
+        <p:fade/>
+      </p:transition>
+    </mc:Fallback>
+  </mc:AlternateContent>
+  <p:timing>
+    <p:tnLst>
+      <p:par>
+        <p:cTn id="1" dur="indefinite" restart="never" nodeType="tmRoot">
+          <p:childTnLst>
+            <p:seq concurrent="1" nextAc="seek">
+              <p:cTn id="2" dur="indefinite" nodeType="mainSeq">
+                <p:childTnLst>
+                  <p:par>
+                    <p:cTn id="3" fill="hold">
+                      <p:stCondLst>
+                        <p:cond delay="indefinite"/>
+                      </p:stCondLst>
+                      <p:childTnLst>
+                        <p:par>
+                          <p:cTn id="4" fill="hold">
+                            <p:stCondLst>
+                              <p:cond delay="0"/>
+                            </p:stCondLst>
+                            <p:childTnLst>
+                              <p:par>
+                                <p:cTn id="5" presetID="1" presetClass="entr" presetSubtype="0" fill="hold" grpId="0" nodeType="clickEffect">
+                                  <p:stCondLst>
+                                    <p:cond delay="0"/>
+                                  </p:stCondLst>
+                                  <p:childTnLst>
+                                    <p:set>
+                                      <p:cBhvr>
+                                        <p:cTn id="6" dur="1" fill="hold">
+                                          <p:stCondLst>
+                                            <p:cond delay="0"/>
+                                          </p:stCondLst>
+                                        </p:cTn>
+                                        <p:tgtEl>
+                                          <p:spTgt spid="3">
+                                            <p:txEl>
+                                              <p:pRg st="0" end="0"/>
+                                            </p:txEl>
+                                          </p:spTgt>
+                                        </p:tgtEl>
+                                        <p:attrNameLst>
+                                          <p:attrName>style.visibility</p:attrName>
+                                        </p:attrNameLst>
+                                      </p:cBhvr>
+                                      <p:to>
+                                        <p:strVal val="visible"/>
+                                      </p:to>
+                                    </p:set>
+                                  </p:childTnLst>
+                                </p:cTn>
+                              </p:par>
+                            </p:childTnLst>
+                          </p:cTn>
+                        </p:par>
+                      </p:childTnLst>
+                    </p:cTn>
+                  </p:par>
+                  <p:par>
+                    <p:cTn id="7" fill="hold">
+                      <p:stCondLst>
+                        <p:cond delay="indefinite"/>
+                      </p:stCondLst>
+                      <p:childTnLst>
+                        <p:par>
+                          <p:cTn id="8" fill="hold">
+                            <p:stCondLst>
+                              <p:cond delay="0"/>
+                            </p:stCondLst>
+                            <p:childTnLst>
+                              <p:par>
+                                <p:cTn id="9" presetID="1" presetClass="entr" presetSubtype="0" fill="hold" grpId="0" nodeType="clickEffect">
+                                  <p:stCondLst>
+                                    <p:cond delay="0"/>
+                                  </p:stCondLst>
+                                  <p:childTnLst>
+                                    <p:set>
+                                      <p:cBhvr>
+                                        <p:cTn id="10" dur="1" fill="hold">
+                                          <p:stCondLst>
+                                            <p:cond delay="0"/>
+                                          </p:stCondLst>
+                                        </p:cTn>
+                                        <p:tgtEl>
+                                          <p:spTgt spid="3">
+                                            <p:txEl>
+                                              <p:pRg st="1" end="1"/>
+                                            </p:txEl>
+                                          </p:spTgt>
+                                        </p:tgtEl>
+                                        <p:attrNameLst>
+                                          <p:attrName>style.visibility</p:attrName>
+                                        </p:attrNameLst>
+                                      </p:cBhvr>
+                                      <p:to>
+                                        <p:strVal val="visible"/>
+                                      </p:to>
+                                    </p:set>
+                                  </p:childTnLst>
+                                </p:cTn>
+                              </p:par>
+                            </p:childTnLst>
+                          </p:cTn>
+                        </p:par>
+                      </p:childTnLst>
+                    </p:cTn>
+                  </p:par>
+                  <p:par>
+                    <p:cTn id="11" fill="hold">
+                      <p:stCondLst>
+                        <p:cond delay="indefinite"/>
+                      </p:stCondLst>
+                      <p:childTnLst>
+                        <p:par>
+                          <p:cTn id="12" fill="hold">
+                            <p:stCondLst>
+                              <p:cond delay="0"/>
+                            </p:stCondLst>
+                            <p:childTnLst>
+                              <p:par>
+                                <p:cTn id="13" presetID="1" presetClass="entr" presetSubtype="0" fill="hold" grpId="0" nodeType="clickEffect">
+                                  <p:stCondLst>
+                                    <p:cond delay="0"/>
+                                  </p:stCondLst>
+                                  <p:childTnLst>
+                                    <p:set>
+                                      <p:cBhvr>
+                                        <p:cTn id="14" dur="1" fill="hold">
+                                          <p:stCondLst>
+                                            <p:cond delay="0"/>
+                                          </p:stCondLst>
+                                        </p:cTn>
+                                        <p:tgtEl>
+                                          <p:spTgt spid="3">
+                                            <p:txEl>
+                                              <p:pRg st="2" end="2"/>
+                                            </p:txEl>
+                                          </p:spTgt>
+                                        </p:tgtEl>
+                                        <p:attrNameLst>
+                                          <p:attrName>style.visibility</p:attrName>
+                                        </p:attrNameLst>
+                                      </p:cBhvr>
+                                      <p:to>
+                                        <p:strVal val="visible"/>
+                                      </p:to>
+                                    </p:set>
+                                  </p:childTnLst>
+                                </p:cTn>
+                              </p:par>
+                            </p:childTnLst>
+                          </p:cTn>
+                        </p:par>
+                      </p:childTnLst>
+                    </p:cTn>
+                  </p:par>
+                </p:childTnLst>
+              </p:cTn>
+              <p:prevCondLst>
+                <p:cond evt="onPrev" delay="0">
+                  <p:tgtEl>
+                    <p:sldTgt/>
+                  </p:tgtEl>
+                </p:cond>
+              </p:prevCondLst>
+              <p:nextCondLst>
+                <p:cond evt="onNext" delay="0">
+                  <p:tgtEl>
+                    <p:sldTgt/>
+                  </p:tgtEl>
+                </p:cond>
+              </p:nextCondLst>
+            </p:seq>
+          </p:childTnLst>
+        </p:cTn>
+      </p:par>
+    </p:tnLst>
+    <p:bldLst>
+      <p:bldP spid="3" grpId="0" build="p"/>
+    </p:bldLst>
+  </p:timing>
 </p:sld>
 </file>
 
@@ -11093,6 +12870,18 @@
   <p:clrMapOvr>
     <a:masterClrMapping/>
   </p:clrMapOvr>
+  <mc:AlternateContent xmlns:mc="http://schemas.openxmlformats.org/markup-compatibility/2006">
+    <mc:Choice xmlns:p159="http://schemas.microsoft.com/office/powerpoint/2015/09/main" Requires="p159">
+      <p:transition xmlns:p14="http://schemas.microsoft.com/office/powerpoint/2010/main" spd="slow" p14:dur="2000">
+        <p159:morph option="byObject"/>
+      </p:transition>
+    </mc:Choice>
+    <mc:Fallback>
+      <p:transition spd="slow">
+        <p:fade/>
+      </p:transition>
+    </mc:Fallback>
+  </mc:AlternateContent>
 </p:sld>
 </file>
 

</xml_diff>